<commit_message>
last update + presentation
</commit_message>
<xml_diff>
--- a/Videogames 1980-2023.pptx
+++ b/Videogames 1980-2023.pptx
@@ -122,7 +122,7 @@
 <file path=ppt/revisionInfo.xml><?xml version="1.0" encoding="utf-8"?>
 <p1510:revInfo xmlns:a="http://schemas.openxmlformats.org/drawingml/2006/main" xmlns:r="http://schemas.openxmlformats.org/officeDocument/2006/relationships" xmlns:p1510="http://schemas.microsoft.com/office/powerpoint/2015/10/main">
   <p1510:revLst>
-    <p1510:client id="{7AD59D9D-8729-4F6B-94A5-F21081A77398}" v="20" dt="2024-01-24T19:09:59.456"/>
+    <p1510:client id="{7AD59D9D-8729-4F6B-94A5-F21081A77398}" v="21" dt="2024-02-01T09:25:44.773"/>
   </p1510:revLst>
 </p1510:revInfo>
 </file>
@@ -132,7 +132,7 @@
   <pc:docChgLst>
     <pc:chgData name="Claudia Mattes" userId="ba5ee25ea3f71f07" providerId="LiveId" clId="{7AD59D9D-8729-4F6B-94A5-F21081A77398}"/>
     <pc:docChg chg="undo redo custSel addSld modSld">
-      <pc:chgData name="Claudia Mattes" userId="ba5ee25ea3f71f07" providerId="LiveId" clId="{7AD59D9D-8729-4F6B-94A5-F21081A77398}" dt="2024-01-25T10:56:02.334" v="1392" actId="20577"/>
+      <pc:chgData name="Claudia Mattes" userId="ba5ee25ea3f71f07" providerId="LiveId" clId="{7AD59D9D-8729-4F6B-94A5-F21081A77398}" dt="2024-02-01T09:25:44.770" v="1393"/>
       <pc:docMkLst>
         <pc:docMk/>
       </pc:docMkLst>
@@ -223,7 +223,7 @@
         </pc:picChg>
       </pc:sldChg>
       <pc:sldChg chg="addSp delSp modSp mod setBg">
-        <pc:chgData name="Claudia Mattes" userId="ba5ee25ea3f71f07" providerId="LiveId" clId="{7AD59D9D-8729-4F6B-94A5-F21081A77398}" dt="2024-01-24T19:24:03.872" v="1327" actId="26606"/>
+        <pc:chgData name="Claudia Mattes" userId="ba5ee25ea3f71f07" providerId="LiveId" clId="{7AD59D9D-8729-4F6B-94A5-F21081A77398}" dt="2024-02-01T09:25:44.770" v="1393"/>
         <pc:sldMkLst>
           <pc:docMk/>
           <pc:sldMk cId="1708699435" sldId="258"/>
@@ -261,7 +261,7 @@
           </ac:spMkLst>
         </pc:spChg>
         <pc:graphicFrameChg chg="add mod modGraphic">
-          <ac:chgData name="Claudia Mattes" userId="ba5ee25ea3f71f07" providerId="LiveId" clId="{7AD59D9D-8729-4F6B-94A5-F21081A77398}" dt="2024-01-24T19:24:03.872" v="1327" actId="26606"/>
+          <ac:chgData name="Claudia Mattes" userId="ba5ee25ea3f71f07" providerId="LiveId" clId="{7AD59D9D-8729-4F6B-94A5-F21081A77398}" dt="2024-02-01T09:25:44.770" v="1393"/>
           <ac:graphicFrameMkLst>
             <pc:docMk/>
             <pc:sldMk cId="1708699435" sldId="258"/>
@@ -2299,7 +2299,7 @@
             <a:rPr lang="en-US" b="1"/>
             <a:t>(found via a Google dataset search)</a:t>
           </a:r>
-          <a:endParaRPr lang="en-US" dirty="0">
+          <a:endParaRPr lang="en-US">
             <a:solidFill>
               <a:schemeClr val="accent6">
                 <a:lumMod val="40000"/>
@@ -2340,18 +2340,18 @@
         <a:lstStyle/>
         <a:p>
           <a:r>
-            <a:rPr lang="en-US" b="1" dirty="0"/>
+            <a:rPr lang="en-US" b="1"/>
             <a:t>open-source dataset created by </a:t>
           </a:r>
           <a:r>
-            <a:rPr lang="en-US" b="1" dirty="0" err="1"/>
+            <a:rPr lang="en-US" b="1" err="1"/>
             <a:t>webscraping</a:t>
           </a:r>
           <a:r>
-            <a:rPr lang="en-US" b="1" dirty="0"/>
+            <a:rPr lang="en-US" b="1"/>
             <a:t> backloggd.com (a website to track and review games)</a:t>
           </a:r>
-          <a:endParaRPr lang="en-US" dirty="0"/>
+          <a:endParaRPr lang="en-US"/>
         </a:p>
       </dgm:t>
     </dgm:pt>
@@ -2434,14 +2434,6 @@
             </a:rPr>
             <a:t>General interest in videogames</a:t>
           </a:r>
-          <a:endParaRPr lang="en-US" sz="2600" b="1" kern="1200" dirty="0">
-            <a:solidFill>
-              <a:srgbClr val="FFFFFF"/>
-            </a:solidFill>
-            <a:latin typeface="The Hand Bold"/>
-            <a:ea typeface="+mn-ea"/>
-            <a:cs typeface="+mn-cs"/>
-          </a:endParaRPr>
         </a:p>
       </dgm:t>
     </dgm:pt>
@@ -2487,14 +2479,6 @@
             </a:rPr>
             <a:t>Lots of different data (types), to test different packages and code we learned about</a:t>
           </a:r>
-          <a:endParaRPr lang="en-US" sz="2000" b="1" kern="1200" dirty="0">
-            <a:solidFill>
-              <a:srgbClr val="FFFFFF"/>
-            </a:solidFill>
-            <a:latin typeface="The Hand Bold"/>
-            <a:ea typeface="+mn-ea"/>
-            <a:cs typeface="+mn-cs"/>
-          </a:endParaRPr>
         </a:p>
       </dgm:t>
     </dgm:pt>
@@ -2646,9 +2630,29 @@
         <a:p>
           <a:r>
             <a:rPr lang="de-DE" b="1"/>
-            <a:t>Lots of data cleaning</a:t>
+            <a:t>Lots </a:t>
           </a:r>
-          <a:endParaRPr lang="en-US"/>
+          <a:r>
+            <a:rPr lang="de-DE" b="1" dirty="0" err="1"/>
+            <a:t>of</a:t>
+          </a:r>
+          <a:r>
+            <a:rPr lang="de-DE" b="1" dirty="0"/>
+            <a:t> </a:t>
+          </a:r>
+          <a:r>
+            <a:rPr lang="de-DE" b="1" dirty="0" err="1"/>
+            <a:t>data</a:t>
+          </a:r>
+          <a:r>
+            <a:rPr lang="de-DE" b="1" dirty="0"/>
+            <a:t> </a:t>
+          </a:r>
+          <a:r>
+            <a:rPr lang="de-DE" b="1" dirty="0" err="1"/>
+            <a:t>cleaning</a:t>
+          </a:r>
+          <a:endParaRPr lang="en-US" dirty="0"/>
         </a:p>
       </dgm:t>
     </dgm:pt>
@@ -2847,7 +2851,7 @@
       <dgm:spPr/>
     </dgm:pt>
     <dgm:pt modelId="{4AF8AE8F-D621-4B71-862F-40BDC3582001}" type="pres">
-      <dgm:prSet presAssocID="{EEBC9FEC-D302-4797-96F9-171E0F66E791}" presName="FiveNodes_2" presStyleLbl="node1" presStyleIdx="1" presStyleCnt="5">
+      <dgm:prSet presAssocID="{EEBC9FEC-D302-4797-96F9-171E0F66E791}" presName="FiveNodes_2" presStyleLbl="node1" presStyleIdx="1" presStyleCnt="5" custLinFactNeighborX="-326">
         <dgm:presLayoutVars>
           <dgm:bulletEnabled val="1"/>
         </dgm:presLayoutVars>
@@ -3156,14 +3160,6 @@
             </a:rPr>
             <a:t>General interest in videogames</a:t>
           </a:r>
-          <a:endParaRPr lang="en-US" sz="2600" b="1" kern="1200" dirty="0">
-            <a:solidFill>
-              <a:srgbClr val="FFFFFF"/>
-            </a:solidFill>
-            <a:latin typeface="The Hand Bold"/>
-            <a:ea typeface="+mn-ea"/>
-            <a:cs typeface="+mn-cs"/>
-          </a:endParaRPr>
         </a:p>
       </dsp:txBody>
       <dsp:txXfrm>
@@ -3242,14 +3238,6 @@
             </a:rPr>
             <a:t>Lots of different data (types), to test different packages and code we learned about</a:t>
           </a:r>
-          <a:endParaRPr lang="en-US" sz="2000" b="1" kern="1200" dirty="0">
-            <a:solidFill>
-              <a:srgbClr val="FFFFFF"/>
-            </a:solidFill>
-            <a:latin typeface="The Hand Bold"/>
-            <a:ea typeface="+mn-ea"/>
-            <a:cs typeface="+mn-cs"/>
-          </a:endParaRPr>
         </a:p>
       </dsp:txBody>
       <dsp:txXfrm>
@@ -3325,18 +3313,18 @@
             <a:buNone/>
           </a:pPr>
           <a:r>
-            <a:rPr lang="en-US" sz="2600" b="1" kern="1200" dirty="0"/>
+            <a:rPr lang="en-US" sz="2600" b="1" kern="1200"/>
             <a:t>open-source dataset created by </a:t>
           </a:r>
           <a:r>
-            <a:rPr lang="en-US" sz="2600" b="1" kern="1200" dirty="0" err="1"/>
+            <a:rPr lang="en-US" sz="2600" b="1" kern="1200" err="1"/>
             <a:t>webscraping</a:t>
           </a:r>
           <a:r>
-            <a:rPr lang="en-US" sz="2600" b="1" kern="1200" dirty="0"/>
+            <a:rPr lang="en-US" sz="2600" b="1" kern="1200"/>
             <a:t> backloggd.com (a website to track and review games)</a:t>
           </a:r>
-          <a:endParaRPr lang="en-US" sz="2600" kern="1200" dirty="0"/>
+          <a:endParaRPr lang="en-US" sz="2600" kern="1200"/>
         </a:p>
       </dsp:txBody>
       <dsp:txXfrm rot="10800000">
@@ -3448,7 +3436,7 @@
             <a:rPr lang="en-US" sz="2600" b="1" kern="1200"/>
             <a:t>(found via a Google dataset search)</a:t>
           </a:r>
-          <a:endParaRPr lang="en-US" sz="2600" kern="1200" dirty="0">
+          <a:endParaRPr lang="en-US" sz="2600" kern="1200">
             <a:solidFill>
               <a:schemeClr val="accent6">
                 <a:lumMod val="40000"/>
@@ -3546,9 +3534,29 @@
           </a:pPr>
           <a:r>
             <a:rPr lang="de-DE" sz="2700" b="1" kern="1200"/>
-            <a:t>Lots of data cleaning</a:t>
+            <a:t>Lots </a:t>
           </a:r>
-          <a:endParaRPr lang="en-US" sz="2700" kern="1200"/>
+          <a:r>
+            <a:rPr lang="de-DE" sz="2700" b="1" kern="1200" dirty="0" err="1"/>
+            <a:t>of</a:t>
+          </a:r>
+          <a:r>
+            <a:rPr lang="de-DE" sz="2700" b="1" kern="1200" dirty="0"/>
+            <a:t> </a:t>
+          </a:r>
+          <a:r>
+            <a:rPr lang="de-DE" sz="2700" b="1" kern="1200" dirty="0" err="1"/>
+            <a:t>data</a:t>
+          </a:r>
+          <a:r>
+            <a:rPr lang="de-DE" sz="2700" b="1" kern="1200" dirty="0"/>
+            <a:t> </a:t>
+          </a:r>
+          <a:r>
+            <a:rPr lang="de-DE" sz="2700" b="1" kern="1200" dirty="0" err="1"/>
+            <a:t>cleaning</a:t>
+          </a:r>
+          <a:endParaRPr lang="en-US" sz="2700" kern="1200" dirty="0"/>
         </a:p>
       </dsp:txBody>
       <dsp:txXfrm>
@@ -3563,7 +3571,7 @@
       </dsp:nvSpPr>
       <dsp:spPr>
         <a:xfrm>
-          <a:off x="627662" y="713182"/>
+          <a:off x="600261" y="713182"/>
           <a:ext cx="8405219" cy="626209"/>
         </a:xfrm>
         <a:prstGeom prst="roundRect">
@@ -3633,7 +3641,7 @@
         </a:p>
       </dsp:txBody>
       <dsp:txXfrm>
-        <a:off x="646003" y="731523"/>
+        <a:off x="618602" y="731523"/>
         <a:ext cx="7333838" cy="589527"/>
       </dsp:txXfrm>
     </dsp:sp>
@@ -8268,7 +8276,6 @@
               <a:rPr lang="en-US"/>
               <a:t>Click to edit Master title style</a:t>
             </a:r>
-            <a:endParaRPr lang="en-US" dirty="0"/>
           </a:p>
         </p:txBody>
       </p:sp>
@@ -8338,7 +8345,7 @@
           </a:lstStyle>
           <a:p>
             <a:r>
-              <a:rPr lang="en-US" dirty="0"/>
+              <a:rPr lang="en-US"/>
               <a:t>Click to edit Master subtitle style</a:t>
             </a:r>
           </a:p>
@@ -8367,9 +8374,9 @@
           <a:p>
             <a:fld id="{72345051-2045-45DA-935E-2E3CA1A69ADC}" type="datetimeFigureOut">
               <a:rPr lang="en-US" smtClean="0"/>
-              <a:t>1/25/2024</a:t>
+              <a:t>2/1/2024</a:t>
             </a:fld>
-            <a:endParaRPr lang="en-US" dirty="0"/>
+            <a:endParaRPr lang="en-US"/>
           </a:p>
         </p:txBody>
       </p:sp>
@@ -8508,35 +8515,35 @@
           <a:p>
             <a:pPr lvl="0"/>
             <a:r>
-              <a:rPr lang="en-US" dirty="0"/>
+              <a:rPr lang="en-US"/>
               <a:t>Click to edit Master text styles</a:t>
             </a:r>
           </a:p>
           <a:p>
             <a:pPr lvl="1"/>
             <a:r>
-              <a:rPr lang="en-US" dirty="0"/>
+              <a:rPr lang="en-US"/>
               <a:t>Second level</a:t>
             </a:r>
           </a:p>
           <a:p>
             <a:pPr lvl="2"/>
             <a:r>
-              <a:rPr lang="en-US" dirty="0"/>
+              <a:rPr lang="en-US"/>
               <a:t>Third level</a:t>
             </a:r>
           </a:p>
           <a:p>
             <a:pPr lvl="3"/>
             <a:r>
-              <a:rPr lang="en-US" dirty="0"/>
+              <a:rPr lang="en-US"/>
               <a:t>Fourth level</a:t>
             </a:r>
           </a:p>
           <a:p>
             <a:pPr lvl="4"/>
             <a:r>
-              <a:rPr lang="en-US" dirty="0"/>
+              <a:rPr lang="en-US"/>
               <a:t>Fifth level</a:t>
             </a:r>
           </a:p>
@@ -8565,7 +8572,7 @@
           <a:p>
             <a:fld id="{72345051-2045-45DA-935E-2E3CA1A69ADC}" type="datetimeFigureOut">
               <a:rPr lang="en-US" smtClean="0"/>
-              <a:t>1/25/2024</a:t>
+              <a:t>2/1/2024</a:t>
             </a:fld>
             <a:endParaRPr lang="en-US"/>
           </a:p>
@@ -8716,35 +8723,35 @@
           <a:p>
             <a:pPr lvl="0"/>
             <a:r>
-              <a:rPr lang="en-US" dirty="0"/>
+              <a:rPr lang="en-US"/>
               <a:t>Click to edit Master text styles</a:t>
             </a:r>
           </a:p>
           <a:p>
             <a:pPr lvl="1"/>
             <a:r>
-              <a:rPr lang="en-US" dirty="0"/>
+              <a:rPr lang="en-US"/>
               <a:t>Second level</a:t>
             </a:r>
           </a:p>
           <a:p>
             <a:pPr lvl="2"/>
             <a:r>
-              <a:rPr lang="en-US" dirty="0"/>
+              <a:rPr lang="en-US"/>
               <a:t>Third level</a:t>
             </a:r>
           </a:p>
           <a:p>
             <a:pPr lvl="3"/>
             <a:r>
-              <a:rPr lang="en-US" dirty="0"/>
+              <a:rPr lang="en-US"/>
               <a:t>Fourth level</a:t>
             </a:r>
           </a:p>
           <a:p>
             <a:pPr lvl="4"/>
             <a:r>
-              <a:rPr lang="en-US" dirty="0"/>
+              <a:rPr lang="en-US"/>
               <a:t>Fifth level</a:t>
             </a:r>
           </a:p>
@@ -8773,7 +8780,7 @@
           <a:p>
             <a:fld id="{72345051-2045-45DA-935E-2E3CA1A69ADC}" type="datetimeFigureOut">
               <a:rPr lang="en-US" smtClean="0"/>
-              <a:t>1/25/2024</a:t>
+              <a:t>2/1/2024</a:t>
             </a:fld>
             <a:endParaRPr lang="en-US"/>
           </a:p>
@@ -8888,7 +8895,6 @@
               <a:rPr lang="en-US"/>
               <a:t>Click to edit Master title style</a:t>
             </a:r>
-            <a:endParaRPr lang="en-US" dirty="0"/>
           </a:p>
         </p:txBody>
       </p:sp>
@@ -8938,35 +8944,35 @@
           <a:p>
             <a:pPr lvl="0"/>
             <a:r>
-              <a:rPr lang="en-US" dirty="0"/>
+              <a:rPr lang="en-US"/>
               <a:t>Click to edit Master text styles</a:t>
             </a:r>
           </a:p>
           <a:p>
             <a:pPr lvl="1"/>
             <a:r>
-              <a:rPr lang="en-US" dirty="0"/>
+              <a:rPr lang="en-US"/>
               <a:t>Second level</a:t>
             </a:r>
           </a:p>
           <a:p>
             <a:pPr lvl="2"/>
             <a:r>
-              <a:rPr lang="en-US" dirty="0"/>
+              <a:rPr lang="en-US"/>
               <a:t>Third level</a:t>
             </a:r>
           </a:p>
           <a:p>
             <a:pPr lvl="3"/>
             <a:r>
-              <a:rPr lang="en-US" dirty="0"/>
+              <a:rPr lang="en-US"/>
               <a:t>Fourth level</a:t>
             </a:r>
           </a:p>
           <a:p>
             <a:pPr lvl="4"/>
             <a:r>
-              <a:rPr lang="en-US" dirty="0"/>
+              <a:rPr lang="en-US"/>
               <a:t>Fifth level</a:t>
             </a:r>
           </a:p>
@@ -8995,7 +9001,7 @@
           <a:p>
             <a:fld id="{72345051-2045-45DA-935E-2E3CA1A69ADC}" type="datetimeFigureOut">
               <a:rPr lang="en-US" smtClean="0"/>
-              <a:t>1/25/2024</a:t>
+              <a:t>2/1/2024</a:t>
             </a:fld>
             <a:endParaRPr lang="en-US"/>
           </a:p>
@@ -9752,7 +9758,6 @@
               <a:rPr lang="en-US"/>
               <a:t>Click to edit Master title style</a:t>
             </a:r>
-            <a:endParaRPr lang="en-US" dirty="0"/>
           </a:p>
         </p:txBody>
       </p:sp>
@@ -9906,7 +9911,7 @@
           <a:p>
             <a:fld id="{72345051-2045-45DA-935E-2E3CA1A69ADC}" type="datetimeFigureOut">
               <a:rPr lang="en-US" smtClean="0"/>
-              <a:t>1/25/2024</a:t>
+              <a:t>2/1/2024</a:t>
             </a:fld>
             <a:endParaRPr lang="en-US"/>
           </a:p>
@@ -10357,7 +10362,6 @@
               <a:rPr lang="en-US"/>
               <a:t>Click to edit Master title style</a:t>
             </a:r>
-            <a:endParaRPr lang="en-US" dirty="0"/>
           </a:p>
         </p:txBody>
       </p:sp>
@@ -10389,35 +10393,35 @@
           <a:p>
             <a:pPr lvl="0"/>
             <a:r>
-              <a:rPr lang="en-US" dirty="0"/>
+              <a:rPr lang="en-US"/>
               <a:t>Click to edit Master text styles</a:t>
             </a:r>
           </a:p>
           <a:p>
             <a:pPr lvl="1"/>
             <a:r>
-              <a:rPr lang="en-US" dirty="0"/>
+              <a:rPr lang="en-US"/>
               <a:t>Second level</a:t>
             </a:r>
           </a:p>
           <a:p>
             <a:pPr lvl="2"/>
             <a:r>
-              <a:rPr lang="en-US" dirty="0"/>
+              <a:rPr lang="en-US"/>
               <a:t>Third level</a:t>
             </a:r>
           </a:p>
           <a:p>
             <a:pPr lvl="3"/>
             <a:r>
-              <a:rPr lang="en-US" dirty="0"/>
+              <a:rPr lang="en-US"/>
               <a:t>Fourth level</a:t>
             </a:r>
           </a:p>
           <a:p>
             <a:pPr lvl="4"/>
             <a:r>
-              <a:rPr lang="en-US" dirty="0"/>
+              <a:rPr lang="en-US"/>
               <a:t>Fifth level</a:t>
             </a:r>
           </a:p>
@@ -10482,7 +10486,6 @@
               <a:rPr lang="en-US"/>
               <a:t>Fifth level</a:t>
             </a:r>
-            <a:endParaRPr lang="en-US" dirty="0"/>
           </a:p>
         </p:txBody>
       </p:sp>
@@ -10509,7 +10512,7 @@
           <a:p>
             <a:fld id="{72345051-2045-45DA-935E-2E3CA1A69ADC}" type="datetimeFigureOut">
               <a:rPr lang="en-US" smtClean="0"/>
-              <a:t>1/25/2024</a:t>
+              <a:t>2/1/2024</a:t>
             </a:fld>
             <a:endParaRPr lang="en-US"/>
           </a:p>
@@ -11364,35 +11367,35 @@
           <a:p>
             <a:pPr lvl="0"/>
             <a:r>
-              <a:rPr lang="en-US" dirty="0"/>
+              <a:rPr lang="en-US"/>
               <a:t>Click to edit Master text styles</a:t>
             </a:r>
           </a:p>
           <a:p>
             <a:pPr lvl="1"/>
             <a:r>
-              <a:rPr lang="en-US" dirty="0"/>
+              <a:rPr lang="en-US"/>
               <a:t>Second level</a:t>
             </a:r>
           </a:p>
           <a:p>
             <a:pPr lvl="2"/>
             <a:r>
-              <a:rPr lang="en-US" dirty="0"/>
+              <a:rPr lang="en-US"/>
               <a:t>Third level</a:t>
             </a:r>
           </a:p>
           <a:p>
             <a:pPr lvl="3"/>
             <a:r>
-              <a:rPr lang="en-US" dirty="0"/>
+              <a:rPr lang="en-US"/>
               <a:t>Fourth level</a:t>
             </a:r>
           </a:p>
           <a:p>
             <a:pPr lvl="4"/>
             <a:r>
-              <a:rPr lang="en-US" dirty="0"/>
+              <a:rPr lang="en-US"/>
               <a:t>Fifth level</a:t>
             </a:r>
           </a:p>
@@ -11530,7 +11533,6 @@
               <a:rPr lang="en-US"/>
               <a:t>Fifth level</a:t>
             </a:r>
-            <a:endParaRPr lang="en-US" dirty="0"/>
           </a:p>
         </p:txBody>
       </p:sp>
@@ -11557,7 +11559,7 @@
           <a:p>
             <a:fld id="{72345051-2045-45DA-935E-2E3CA1A69ADC}" type="datetimeFigureOut">
               <a:rPr lang="en-US" smtClean="0"/>
-              <a:t>1/25/2024</a:t>
+              <a:t>2/1/2024</a:t>
             </a:fld>
             <a:endParaRPr lang="en-US"/>
           </a:p>
@@ -12314,7 +12316,6 @@
               <a:rPr lang="en-US"/>
               <a:t>Click to edit Master title style</a:t>
             </a:r>
-            <a:endParaRPr lang="en-US" dirty="0"/>
           </a:p>
         </p:txBody>
       </p:sp>
@@ -12341,7 +12342,7 @@
           <a:p>
             <a:fld id="{72345051-2045-45DA-935E-2E3CA1A69ADC}" type="datetimeFigureOut">
               <a:rPr lang="en-US" smtClean="0"/>
-              <a:t>1/25/2024</a:t>
+              <a:t>2/1/2024</a:t>
             </a:fld>
             <a:endParaRPr lang="en-US"/>
           </a:p>
@@ -12790,7 +12791,7 @@
           <a:p>
             <a:fld id="{72345051-2045-45DA-935E-2E3CA1A69ADC}" type="datetimeFigureOut">
               <a:rPr lang="en-US" smtClean="0"/>
-              <a:t>1/25/2024</a:t>
+              <a:t>2/1/2024</a:t>
             </a:fld>
             <a:endParaRPr lang="en-US"/>
           </a:p>
@@ -12916,7 +12917,6 @@
               <a:rPr lang="en-US"/>
               <a:t>Click to edit Master title style</a:t>
             </a:r>
-            <a:endParaRPr lang="en-US" dirty="0"/>
           </a:p>
         </p:txBody>
       </p:sp>
@@ -13007,7 +13007,6 @@
               <a:rPr lang="en-US"/>
               <a:t>Fifth level</a:t>
             </a:r>
-            <a:endParaRPr lang="en-US" dirty="0"/>
           </a:p>
         </p:txBody>
       </p:sp>
@@ -13078,7 +13077,7 @@
           <a:p>
             <a:pPr lvl="0"/>
             <a:r>
-              <a:rPr lang="en-US" dirty="0"/>
+              <a:rPr lang="en-US"/>
               <a:t>Click to edit Master text styles</a:t>
             </a:r>
           </a:p>
@@ -13107,7 +13106,7 @@
           <a:p>
             <a:fld id="{72345051-2045-45DA-935E-2E3CA1A69ADC}" type="datetimeFigureOut">
               <a:rPr lang="en-US" smtClean="0"/>
-              <a:t>1/25/2024</a:t>
+              <a:t>2/1/2024</a:t>
             </a:fld>
             <a:endParaRPr lang="en-US"/>
           </a:p>
@@ -13565,7 +13564,6 @@
               <a:rPr lang="en-US"/>
               <a:t>Click to edit Master title style</a:t>
             </a:r>
-            <a:endParaRPr lang="en-US" dirty="0"/>
           </a:p>
         </p:txBody>
       </p:sp>
@@ -13706,7 +13704,7 @@
           <a:p>
             <a:pPr lvl="0"/>
             <a:r>
-              <a:rPr lang="en-US" dirty="0"/>
+              <a:rPr lang="en-US"/>
               <a:t>Click to edit Master text styles</a:t>
             </a:r>
           </a:p>
@@ -13735,7 +13733,7 @@
           <a:p>
             <a:fld id="{72345051-2045-45DA-935E-2E3CA1A69ADC}" type="datetimeFigureOut">
               <a:rPr lang="en-US" smtClean="0"/>
-              <a:t>1/25/2024</a:t>
+              <a:t>2/1/2024</a:t>
             </a:fld>
             <a:endParaRPr lang="en-US"/>
           </a:p>
@@ -14194,7 +14192,7 @@
           <a:lstStyle/>
           <a:p>
             <a:r>
-              <a:rPr lang="en-US" dirty="0"/>
+              <a:rPr lang="en-US"/>
               <a:t>Click to edit Master title style</a:t>
             </a:r>
           </a:p>
@@ -14233,35 +14231,35 @@
           <a:p>
             <a:pPr lvl="0"/>
             <a:r>
-              <a:rPr lang="en-US" dirty="0"/>
+              <a:rPr lang="en-US"/>
               <a:t>Click to edit Master text styles</a:t>
             </a:r>
           </a:p>
           <a:p>
             <a:pPr lvl="1"/>
             <a:r>
-              <a:rPr lang="en-US" dirty="0"/>
+              <a:rPr lang="en-US"/>
               <a:t>Second level</a:t>
             </a:r>
           </a:p>
           <a:p>
             <a:pPr lvl="2"/>
             <a:r>
-              <a:rPr lang="en-US" dirty="0"/>
+              <a:rPr lang="en-US"/>
               <a:t>Third level</a:t>
             </a:r>
           </a:p>
           <a:p>
             <a:pPr lvl="3"/>
             <a:r>
-              <a:rPr lang="en-US" dirty="0"/>
+              <a:rPr lang="en-US"/>
               <a:t>Fourth level</a:t>
             </a:r>
           </a:p>
           <a:p>
             <a:pPr lvl="4"/>
             <a:r>
-              <a:rPr lang="en-US" dirty="0"/>
+              <a:rPr lang="en-US"/>
               <a:t>Fifth level</a:t>
             </a:r>
           </a:p>
@@ -14308,9 +14306,9 @@
           <a:p>
             <a:fld id="{72345051-2045-45DA-935E-2E3CA1A69ADC}" type="datetimeFigureOut">
               <a:rPr lang="en-US" smtClean="0"/>
-              <a:t>1/25/2024</a:t>
+              <a:t>2/1/2024</a:t>
             </a:fld>
-            <a:endParaRPr lang="en-US" dirty="0"/>
+            <a:endParaRPr lang="en-US"/>
           </a:p>
         </p:txBody>
       </p:sp>
@@ -14353,7 +14351,7 @@
             </a:lvl1pPr>
           </a:lstStyle>
           <a:p>
-            <a:endParaRPr lang="en-US" dirty="0"/>
+            <a:endParaRPr lang="en-US"/>
           </a:p>
         </p:txBody>
       </p:sp>
@@ -14400,7 +14398,7 @@
               <a:rPr lang="en-US" smtClean="0"/>
               <a:t>‹Nr.›</a:t>
             </a:fld>
-            <a:endParaRPr lang="en-US" dirty="0"/>
+            <a:endParaRPr lang="en-US"/>
           </a:p>
         </p:txBody>
       </p:sp>
@@ -14854,10 +14852,10 @@
           <a:p>
             <a:pPr algn="ctr"/>
             <a:r>
-              <a:rPr lang="de-DE" dirty="0"/>
+              <a:rPr lang="de-DE"/>
               <a:t>Videogames 1980-2023</a:t>
             </a:r>
-            <a:endParaRPr lang="de-AT" dirty="0"/>
+            <a:endParaRPr lang="de-AT"/>
           </a:p>
         </p:txBody>
       </p:sp>
@@ -14891,7 +14889,7 @@
           <a:p>
             <a:pPr algn="ctr"/>
             <a:r>
-              <a:rPr lang="de-DE" sz="3200" u="sng" dirty="0">
+              <a:rPr lang="de-DE" sz="3200" u="sng">
                 <a:solidFill>
                   <a:schemeClr val="accent6">
                     <a:lumMod val="40000"/>
@@ -14905,17 +14903,17 @@
           <a:p>
             <a:pPr algn="ctr"/>
             <a:r>
-              <a:rPr lang="de-DE" sz="3200" dirty="0"/>
+              <a:rPr lang="de-DE" sz="3200"/>
               <a:t>Final Project „DH Tools and Methods“</a:t>
             </a:r>
           </a:p>
           <a:p>
             <a:pPr algn="ctr"/>
             <a:r>
-              <a:rPr lang="de-DE" sz="3200" dirty="0"/>
+              <a:rPr lang="de-DE" sz="3200"/>
               <a:t>Claudia Mattes, 11776443</a:t>
             </a:r>
-            <a:endParaRPr lang="de-AT" sz="3200" dirty="0"/>
+            <a:endParaRPr lang="de-AT" sz="3200"/>
           </a:p>
         </p:txBody>
       </p:sp>
@@ -17035,7 +17033,7 @@
             <p:ph idx="1"/>
             <p:extLst>
               <p:ext uri="{D42A27DB-BD31-4B8C-83A1-F6EECF244321}">
-                <p14:modId xmlns:p14="http://schemas.microsoft.com/office/powerpoint/2010/main" val="3329022084"/>
+                <p14:modId xmlns:p14="http://schemas.microsoft.com/office/powerpoint/2010/main" val="1874809567"/>
               </p:ext>
             </p:extLst>
           </p:nvPr>
@@ -17109,100 +17107,100 @@
           <a:lstStyle/>
           <a:p>
             <a:r>
-              <a:rPr lang="de-DE" sz="2400" b="1" dirty="0">
+              <a:rPr lang="de-DE" sz="2400" b="1">
                 <a:sym typeface="Wingdings" panose="05000000000000000000" pitchFamily="2" charset="2"/>
               </a:rPr>
               <a:t> </a:t>
             </a:r>
             <a:r>
-              <a:rPr lang="de-DE" sz="2400" b="1" dirty="0"/>
+              <a:rPr lang="de-DE" sz="2400" b="1"/>
               <a:t>Genres and Teams in </a:t>
             </a:r>
             <a:r>
-              <a:rPr lang="de-DE" sz="2400" b="1" dirty="0" err="1"/>
+              <a:rPr lang="de-DE" sz="2400" b="1" err="1"/>
               <a:t>the</a:t>
             </a:r>
             <a:r>
-              <a:rPr lang="de-DE" sz="2400" b="1" dirty="0"/>
+              <a:rPr lang="de-DE" sz="2400" b="1"/>
               <a:t> </a:t>
             </a:r>
             <a:r>
-              <a:rPr lang="de-DE" sz="2400" b="1" dirty="0" err="1"/>
+              <a:rPr lang="de-DE" sz="2400" b="1" err="1"/>
               <a:t>dataframe</a:t>
             </a:r>
             <a:r>
-              <a:rPr lang="de-DE" sz="2400" b="1" dirty="0"/>
+              <a:rPr lang="de-DE" sz="2400" b="1"/>
               <a:t>: </a:t>
             </a:r>
             <a:r>
-              <a:rPr lang="de-DE" sz="2400" b="1" dirty="0" err="1"/>
+              <a:rPr lang="de-DE" sz="2400" b="1" err="1"/>
               <a:t>extracting</a:t>
             </a:r>
             <a:r>
-              <a:rPr lang="de-DE" sz="2400" b="1" dirty="0"/>
+              <a:rPr lang="de-DE" sz="2400" b="1"/>
               <a:t> </a:t>
             </a:r>
             <a:r>
-              <a:rPr lang="de-DE" sz="2400" b="1" dirty="0" err="1"/>
+              <a:rPr lang="de-DE" sz="2400" b="1" err="1"/>
               <a:t>the</a:t>
             </a:r>
             <a:r>
-              <a:rPr lang="de-DE" sz="2400" b="1" dirty="0"/>
+              <a:rPr lang="de-DE" sz="2400" b="1"/>
               <a:t> </a:t>
             </a:r>
             <a:r>
-              <a:rPr lang="de-DE" sz="2400" b="1" dirty="0" err="1"/>
+              <a:rPr lang="de-DE" sz="2400" b="1" err="1"/>
               <a:t>singular</a:t>
             </a:r>
             <a:r>
-              <a:rPr lang="de-DE" sz="2400" b="1" dirty="0"/>
+              <a:rPr lang="de-DE" sz="2400" b="1"/>
               <a:t> </a:t>
             </a:r>
             <a:r>
-              <a:rPr lang="de-DE" sz="2400" b="1" dirty="0" err="1"/>
+              <a:rPr lang="de-DE" sz="2400" b="1" err="1"/>
               <a:t>genres</a:t>
             </a:r>
             <a:r>
-              <a:rPr lang="de-DE" sz="2400" b="1" dirty="0"/>
+              <a:rPr lang="de-DE" sz="2400" b="1"/>
               <a:t> and </a:t>
             </a:r>
             <a:r>
-              <a:rPr lang="de-DE" sz="2400" b="1" dirty="0" err="1"/>
+              <a:rPr lang="de-DE" sz="2400" b="1" err="1"/>
               <a:t>teams</a:t>
             </a:r>
             <a:r>
-              <a:rPr lang="de-DE" sz="2400" b="1" dirty="0"/>
+              <a:rPr lang="de-DE" sz="2400" b="1"/>
               <a:t> </a:t>
             </a:r>
             <a:r>
-              <a:rPr lang="de-DE" sz="2400" b="1" dirty="0" err="1"/>
+              <a:rPr lang="de-DE" sz="2400" b="1" err="1"/>
               <a:t>from</a:t>
             </a:r>
             <a:r>
-              <a:rPr lang="de-DE" sz="2400" b="1" dirty="0"/>
+              <a:rPr lang="de-DE" sz="2400" b="1"/>
               <a:t> </a:t>
             </a:r>
             <a:r>
-              <a:rPr lang="de-DE" sz="2400" b="1" dirty="0" err="1"/>
+              <a:rPr lang="de-DE" sz="2400" b="1" err="1"/>
               <a:t>the</a:t>
             </a:r>
             <a:r>
-              <a:rPr lang="de-DE" sz="2400" b="1" dirty="0"/>
+              <a:rPr lang="de-DE" sz="2400" b="1"/>
               <a:t> </a:t>
             </a:r>
             <a:r>
-              <a:rPr lang="de-DE" sz="2400" b="1" dirty="0" err="1"/>
+              <a:rPr lang="de-DE" sz="2400" b="1" err="1"/>
               <a:t>dataframe</a:t>
             </a:r>
             <a:r>
-              <a:rPr lang="de-DE" sz="2400" b="1" dirty="0"/>
+              <a:rPr lang="de-DE" sz="2400" b="1"/>
               <a:t> </a:t>
             </a:r>
             <a:r>
-              <a:rPr lang="de-DE" sz="2400" b="1" dirty="0" err="1"/>
+              <a:rPr lang="de-DE" sz="2400" b="1" err="1"/>
               <a:t>columns</a:t>
             </a:r>
-            <a:endParaRPr lang="de-AT" sz="2400" b="1" dirty="0"/>
+            <a:endParaRPr lang="de-AT" sz="2400" b="1"/>
           </a:p>
         </p:txBody>
       </p:sp>
@@ -17317,10 +17315,10 @@
           <a:lstStyle/>
           <a:p>
             <a:r>
-              <a:rPr lang="de-DE" dirty="0"/>
+              <a:rPr lang="de-DE"/>
               <a:t>Games per Year</a:t>
             </a:r>
-            <a:endParaRPr lang="de-AT" dirty="0"/>
+            <a:endParaRPr lang="de-AT"/>
           </a:p>
         </p:txBody>
       </p:sp>
@@ -17353,156 +17351,156 @@
           <a:lstStyle/>
           <a:p>
             <a:r>
-              <a:rPr lang="de-DE" sz="2800" b="1" dirty="0" err="1"/>
+              <a:rPr lang="de-DE" sz="2800" b="1" err="1"/>
               <a:t>Continuous</a:t>
             </a:r>
             <a:r>
-              <a:rPr lang="de-DE" sz="2800" b="1" dirty="0"/>
+              <a:rPr lang="de-DE" sz="2800" b="1"/>
               <a:t> </a:t>
             </a:r>
             <a:r>
-              <a:rPr lang="de-DE" sz="2800" b="1" dirty="0" err="1"/>
+              <a:rPr lang="de-DE" sz="2800" b="1" err="1"/>
               <a:t>growth</a:t>
             </a:r>
             <a:r>
-              <a:rPr lang="de-DE" sz="2800" b="1" dirty="0"/>
+              <a:rPr lang="de-DE" sz="2800" b="1"/>
               <a:t> </a:t>
             </a:r>
             <a:r>
-              <a:rPr lang="de-DE" sz="2800" b="1" dirty="0" err="1"/>
+              <a:rPr lang="de-DE" sz="2800" b="1" err="1"/>
               <a:t>over</a:t>
             </a:r>
             <a:r>
-              <a:rPr lang="de-DE" sz="2800" b="1" dirty="0"/>
+              <a:rPr lang="de-DE" sz="2800" b="1"/>
               <a:t> </a:t>
             </a:r>
             <a:r>
-              <a:rPr lang="de-DE" sz="2800" b="1" dirty="0" err="1"/>
+              <a:rPr lang="de-DE" sz="2800" b="1" err="1"/>
               <a:t>the</a:t>
             </a:r>
             <a:r>
-              <a:rPr lang="de-DE" sz="2800" b="1" dirty="0"/>
+              <a:rPr lang="de-DE" sz="2800" b="1"/>
               <a:t> </a:t>
             </a:r>
             <a:r>
-              <a:rPr lang="de-DE" sz="2800" b="1" dirty="0" err="1"/>
+              <a:rPr lang="de-DE" sz="2800" b="1" err="1"/>
               <a:t>years</a:t>
             </a:r>
-            <a:endParaRPr lang="de-DE" sz="2800" b="1" dirty="0"/>
+            <a:endParaRPr lang="de-DE" sz="2800" b="1"/>
           </a:p>
           <a:p>
-            <a:endParaRPr lang="de-DE" sz="2800" b="1" dirty="0"/>
+            <a:endParaRPr lang="de-DE" sz="2800" b="1"/>
           </a:p>
           <a:p>
             <a:r>
-              <a:rPr lang="de-DE" sz="2800" b="1" dirty="0"/>
+              <a:rPr lang="de-DE" sz="2800" b="1"/>
               <a:t>But: also </a:t>
             </a:r>
             <a:r>
-              <a:rPr lang="de-DE" sz="2800" b="1" dirty="0" err="1"/>
+              <a:rPr lang="de-DE" sz="2800" b="1" err="1"/>
               <a:t>data</a:t>
             </a:r>
             <a:r>
-              <a:rPr lang="de-DE" sz="2800" b="1" dirty="0"/>
+              <a:rPr lang="de-DE" sz="2800" b="1"/>
               <a:t> </a:t>
             </a:r>
             <a:r>
-              <a:rPr lang="de-DE" sz="2800" b="1" dirty="0" err="1"/>
+              <a:rPr lang="de-DE" sz="2800" b="1" err="1"/>
               <a:t>bias</a:t>
             </a:r>
             <a:r>
-              <a:rPr lang="de-DE" sz="2800" b="1" dirty="0"/>
+              <a:rPr lang="de-DE" sz="2800" b="1"/>
               <a:t>, </a:t>
             </a:r>
             <a:r>
-              <a:rPr lang="de-DE" sz="2800" b="1" dirty="0" err="1"/>
+              <a:rPr lang="de-DE" sz="2800" b="1" err="1"/>
               <a:t>the</a:t>
             </a:r>
             <a:r>
-              <a:rPr lang="de-DE" sz="2800" b="1" dirty="0"/>
+              <a:rPr lang="de-DE" sz="2800" b="1"/>
               <a:t> </a:t>
             </a:r>
             <a:r>
-              <a:rPr lang="de-DE" sz="2800" b="1" dirty="0" err="1"/>
+              <a:rPr lang="de-DE" sz="2800" b="1" err="1"/>
               <a:t>website</a:t>
             </a:r>
             <a:r>
-              <a:rPr lang="de-DE" sz="2800" b="1" dirty="0"/>
+              <a:rPr lang="de-DE" sz="2800" b="1"/>
               <a:t> </a:t>
             </a:r>
             <a:r>
-              <a:rPr lang="de-DE" sz="2800" b="1" dirty="0" err="1"/>
+              <a:rPr lang="de-DE" sz="2800" b="1" err="1"/>
               <a:t>only</a:t>
             </a:r>
             <a:r>
-              <a:rPr lang="de-DE" sz="2800" b="1" dirty="0"/>
+              <a:rPr lang="de-DE" sz="2800" b="1"/>
               <a:t> </a:t>
             </a:r>
             <a:r>
-              <a:rPr lang="de-DE" sz="2800" b="1" dirty="0" err="1"/>
+              <a:rPr lang="de-DE" sz="2800" b="1" err="1"/>
               <a:t>retroactively</a:t>
             </a:r>
             <a:r>
-              <a:rPr lang="de-DE" sz="2800" b="1" dirty="0"/>
+              <a:rPr lang="de-DE" sz="2800" b="1"/>
               <a:t> </a:t>
             </a:r>
             <a:r>
-              <a:rPr lang="de-DE" sz="2800" b="1" dirty="0" err="1"/>
+              <a:rPr lang="de-DE" sz="2800" b="1" err="1"/>
               <a:t>looked</a:t>
             </a:r>
             <a:r>
-              <a:rPr lang="de-DE" sz="2800" b="1" dirty="0"/>
+              <a:rPr lang="de-DE" sz="2800" b="1"/>
               <a:t> at </a:t>
             </a:r>
             <a:r>
-              <a:rPr lang="de-DE" sz="2800" b="1" dirty="0" err="1"/>
+              <a:rPr lang="de-DE" sz="2800" b="1" err="1"/>
               <a:t>some</a:t>
             </a:r>
             <a:r>
-              <a:rPr lang="de-DE" sz="2800" b="1" dirty="0"/>
+              <a:rPr lang="de-DE" sz="2800" b="1"/>
               <a:t> </a:t>
             </a:r>
             <a:r>
-              <a:rPr lang="de-DE" sz="2800" b="1" dirty="0" err="1"/>
+              <a:rPr lang="de-DE" sz="2800" b="1" err="1"/>
               <a:t>games</a:t>
             </a:r>
             <a:r>
-              <a:rPr lang="de-DE" sz="2800" b="1" dirty="0"/>
+              <a:rPr lang="de-DE" sz="2800" b="1"/>
               <a:t> (</a:t>
             </a:r>
             <a:r>
-              <a:rPr lang="de-DE" sz="2800" b="1" dirty="0" err="1"/>
+              <a:rPr lang="de-DE" sz="2800" b="1" err="1"/>
               <a:t>the</a:t>
             </a:r>
             <a:r>
-              <a:rPr lang="de-DE" sz="2800" b="1" dirty="0"/>
+              <a:rPr lang="de-DE" sz="2800" b="1"/>
               <a:t> </a:t>
             </a:r>
             <a:r>
-              <a:rPr lang="de-DE" sz="2800" b="1" dirty="0" err="1"/>
+              <a:rPr lang="de-DE" sz="2800" b="1" err="1"/>
               <a:t>more</a:t>
             </a:r>
             <a:r>
-              <a:rPr lang="de-DE" sz="2800" b="1" dirty="0"/>
+              <a:rPr lang="de-DE" sz="2800" b="1"/>
               <a:t> </a:t>
             </a:r>
             <a:r>
-              <a:rPr lang="de-DE" sz="2800" b="1" dirty="0" err="1"/>
+              <a:rPr lang="de-DE" sz="2800" b="1" err="1"/>
               <a:t>popular</a:t>
             </a:r>
             <a:r>
-              <a:rPr lang="de-DE" sz="2800" b="1" dirty="0"/>
+              <a:rPr lang="de-DE" sz="2800" b="1"/>
               <a:t> </a:t>
             </a:r>
             <a:r>
-              <a:rPr lang="de-DE" sz="2800" b="1" dirty="0" err="1"/>
+              <a:rPr lang="de-DE" sz="2800" b="1" err="1"/>
               <a:t>games</a:t>
             </a:r>
             <a:r>
-              <a:rPr lang="de-DE" sz="2800" b="1" dirty="0"/>
+              <a:rPr lang="de-DE" sz="2800" b="1"/>
               <a:t> </a:t>
             </a:r>
-            <a:endParaRPr lang="de-AT" sz="2800" b="1" dirty="0"/>
+            <a:endParaRPr lang="de-AT" sz="2800" b="1"/>
           </a:p>
         </p:txBody>
       </p:sp>
@@ -17535,15 +17533,15 @@
           <a:lstStyle/>
           <a:p>
             <a:r>
-              <a:rPr lang="de-AT" dirty="0">
+              <a:rPr lang="de-AT">
                 <a:hlinkClick r:id="rId2"/>
               </a:rPr>
               <a:t>https://github.com/claudiamattes98/videogames_final_project/blob/main/EDA.ipynb</a:t>
             </a:r>
-            <a:endParaRPr lang="de-AT" dirty="0"/>
+            <a:endParaRPr lang="de-AT"/>
           </a:p>
           <a:p>
-            <a:endParaRPr lang="de-AT" dirty="0"/>
+            <a:endParaRPr lang="de-AT"/>
           </a:p>
         </p:txBody>
       </p:sp>
@@ -18017,37 +18015,33 @@
           <a:p>
             <a:r>
               <a:rPr lang="de-DE" b="1"/>
-              <a:t>Teams and Genres </a:t>
+              <a:t>Teams and Genres in </a:t>
             </a:r>
             <a:r>
-              <a:rPr lang="de-DE" b="1" dirty="0"/>
-              <a:t>in </a:t>
-            </a:r>
-            <a:r>
-              <a:rPr lang="de-DE" b="1" dirty="0" err="1"/>
+              <a:rPr lang="de-DE" b="1" err="1"/>
               <a:t>the</a:t>
             </a:r>
             <a:r>
-              <a:rPr lang="de-DE" b="1" dirty="0"/>
+              <a:rPr lang="de-DE" b="1"/>
               <a:t> </a:t>
             </a:r>
             <a:r>
-              <a:rPr lang="de-DE" b="1" dirty="0" err="1"/>
+              <a:rPr lang="de-DE" b="1" err="1"/>
               <a:t>dataframe</a:t>
             </a:r>
-            <a:endParaRPr lang="de-DE" b="1" dirty="0"/>
+            <a:endParaRPr lang="de-DE" b="1"/>
           </a:p>
           <a:p>
-            <a:endParaRPr lang="de-DE" b="1" dirty="0"/>
+            <a:endParaRPr lang="de-DE" b="1"/>
           </a:p>
           <a:p>
             <a:pPr marL="0" indent="0">
               <a:buNone/>
             </a:pPr>
-            <a:endParaRPr lang="de-AT" b="1" dirty="0"/>
+            <a:endParaRPr lang="de-AT" b="1"/>
           </a:p>
           <a:p>
-            <a:endParaRPr lang="de-AT" dirty="0"/>
+            <a:endParaRPr lang="de-AT"/>
           </a:p>
         </p:txBody>
       </p:sp>
@@ -19042,7 +19036,7 @@
           <a:lstStyle/>
           <a:p>
             <a:r>
-              <a:rPr lang="de-DE" sz="2600" b="1" dirty="0">
+              <a:rPr lang="de-DE" sz="2600" b="1">
                 <a:solidFill>
                   <a:schemeClr val="bg1"/>
                 </a:solidFill>
@@ -19050,7 +19044,7 @@
               <a:t>NLP </a:t>
             </a:r>
             <a:r>
-              <a:rPr lang="de-DE" sz="2600" b="1" dirty="0" err="1">
+              <a:rPr lang="de-DE" sz="2600" b="1" err="1">
                 <a:solidFill>
                   <a:schemeClr val="bg1"/>
                 </a:solidFill>
@@ -19058,7 +19052,7 @@
               <a:t>with</a:t>
             </a:r>
             <a:r>
-              <a:rPr lang="de-DE" sz="2600" b="1" dirty="0">
+              <a:rPr lang="de-DE" sz="2600" b="1">
                 <a:solidFill>
                   <a:schemeClr val="bg1"/>
                 </a:solidFill>
@@ -19066,14 +19060,14 @@
               <a:t> RPG Game </a:t>
             </a:r>
             <a:r>
-              <a:rPr lang="de-DE" sz="2600" b="1" dirty="0" err="1">
+              <a:rPr lang="de-DE" sz="2600" b="1" err="1">
                 <a:solidFill>
                   <a:schemeClr val="bg1"/>
                 </a:solidFill>
               </a:rPr>
               <a:t>Summaries</a:t>
             </a:r>
-            <a:endParaRPr lang="de-DE" sz="2600" b="1" dirty="0">
+            <a:endParaRPr lang="de-DE" sz="2600" b="1">
               <a:solidFill>
                 <a:schemeClr val="bg1"/>
               </a:solidFill>
@@ -19081,7 +19075,7 @@
           </a:p>
           <a:p>
             <a:r>
-              <a:rPr lang="de-DE" sz="2600" b="1" dirty="0" err="1">
+              <a:rPr lang="de-DE" sz="2600" b="1" err="1">
                 <a:solidFill>
                   <a:schemeClr val="bg1"/>
                 </a:solidFill>
@@ -19089,7 +19083,7 @@
               <a:t>Nltk</a:t>
             </a:r>
             <a:r>
-              <a:rPr lang="de-DE" sz="2600" b="1" dirty="0">
+              <a:rPr lang="de-DE" sz="2600" b="1">
                 <a:solidFill>
                   <a:schemeClr val="bg1"/>
                 </a:solidFill>
@@ -19097,7 +19091,7 @@
               <a:t> </a:t>
             </a:r>
             <a:r>
-              <a:rPr lang="de-DE" sz="2600" b="1" dirty="0" err="1">
+              <a:rPr lang="de-DE" sz="2600" b="1" err="1">
                 <a:solidFill>
                   <a:schemeClr val="bg1"/>
                 </a:solidFill>
@@ -19105,7 +19099,7 @@
               <a:t>Ngrams</a:t>
             </a:r>
             <a:r>
-              <a:rPr lang="de-DE" sz="2600" b="1" dirty="0">
+              <a:rPr lang="de-DE" sz="2600" b="1">
                 <a:solidFill>
                   <a:schemeClr val="bg1"/>
                 </a:solidFill>
@@ -19113,7 +19107,7 @@
               <a:t>: </a:t>
             </a:r>
             <a:r>
-              <a:rPr lang="de-DE" sz="2600" b="1" dirty="0" err="1">
+              <a:rPr lang="de-DE" sz="2600" b="1" err="1">
                 <a:solidFill>
                   <a:schemeClr val="bg1"/>
                 </a:solidFill>
@@ -19121,7 +19115,7 @@
               <a:t>what</a:t>
             </a:r>
             <a:r>
-              <a:rPr lang="de-DE" sz="2600" b="1" dirty="0">
+              <a:rPr lang="de-DE" sz="2600" b="1">
                 <a:solidFill>
                   <a:schemeClr val="bg1"/>
                 </a:solidFill>
@@ -19129,7 +19123,7 @@
               <a:t> </a:t>
             </a:r>
             <a:r>
-              <a:rPr lang="de-DE" sz="2600" b="1" dirty="0" err="1">
+              <a:rPr lang="de-DE" sz="2600" b="1" err="1">
                 <a:solidFill>
                   <a:schemeClr val="bg1"/>
                 </a:solidFill>
@@ -19137,7 +19131,7 @@
               <a:t>are</a:t>
             </a:r>
             <a:r>
-              <a:rPr lang="de-DE" sz="2600" b="1" dirty="0">
+              <a:rPr lang="de-DE" sz="2600" b="1">
                 <a:solidFill>
                   <a:schemeClr val="bg1"/>
                 </a:solidFill>
@@ -19145,7 +19139,7 @@
               <a:t> RPG </a:t>
             </a:r>
             <a:r>
-              <a:rPr lang="de-DE" sz="2600" b="1" dirty="0" err="1">
+              <a:rPr lang="de-DE" sz="2600" b="1" err="1">
                 <a:solidFill>
                   <a:schemeClr val="bg1"/>
                 </a:solidFill>
@@ -19153,7 +19147,7 @@
               <a:t>games</a:t>
             </a:r>
             <a:r>
-              <a:rPr lang="de-DE" sz="2600" b="1" dirty="0">
+              <a:rPr lang="de-DE" sz="2600" b="1">
                 <a:solidFill>
                   <a:schemeClr val="bg1"/>
                 </a:solidFill>
@@ -19161,7 +19155,7 @@
               <a:t> </a:t>
             </a:r>
             <a:r>
-              <a:rPr lang="de-DE" sz="2600" b="1" dirty="0" err="1">
+              <a:rPr lang="de-DE" sz="2600" b="1" err="1">
                 <a:solidFill>
                   <a:schemeClr val="bg1"/>
                 </a:solidFill>
@@ -19169,7 +19163,7 @@
               <a:t>about</a:t>
             </a:r>
             <a:r>
-              <a:rPr lang="de-DE" sz="2600" b="1" dirty="0">
+              <a:rPr lang="de-DE" sz="2600" b="1">
                 <a:solidFill>
                   <a:schemeClr val="bg1"/>
                 </a:solidFill>
@@ -19178,7 +19172,7 @@
             </a:r>
           </a:p>
           <a:p>
-            <a:endParaRPr lang="de-DE" sz="2600" b="1" dirty="0">
+            <a:endParaRPr lang="de-DE" sz="2600" b="1">
               <a:solidFill>
                 <a:schemeClr val="bg1"/>
               </a:solidFill>
@@ -19188,7 +19182,7 @@
             <a:pPr marL="0" indent="0">
               <a:buNone/>
             </a:pPr>
-            <a:endParaRPr lang="de-DE" sz="2600" b="1" dirty="0">
+            <a:endParaRPr lang="de-DE" sz="2600" b="1">
               <a:solidFill>
                 <a:schemeClr val="bg1"/>
               </a:solidFill>
@@ -19196,7 +19190,7 @@
           </a:p>
           <a:p>
             <a:r>
-              <a:rPr lang="de-DE" sz="2600" b="1" dirty="0">
+              <a:rPr lang="de-DE" sz="2600" b="1">
                 <a:solidFill>
                   <a:schemeClr val="bg1"/>
                 </a:solidFill>
@@ -19204,14 +19198,14 @@
               <a:t>Game Reviews: not just </a:t>
             </a:r>
             <a:r>
-              <a:rPr lang="de-DE" sz="2600" b="1" dirty="0" err="1">
+              <a:rPr lang="de-DE" sz="2600" b="1" err="1">
                 <a:solidFill>
                   <a:schemeClr val="bg1"/>
                 </a:solidFill>
               </a:rPr>
               <a:t>english</a:t>
             </a:r>
-            <a:endParaRPr lang="de-DE" sz="2600" b="1" dirty="0">
+            <a:endParaRPr lang="de-DE" sz="2600" b="1">
               <a:solidFill>
                 <a:schemeClr val="bg1"/>
               </a:solidFill>
@@ -19222,7 +19216,7 @@
               <a:buNone/>
             </a:pPr>
             <a:r>
-              <a:rPr lang="de-DE" sz="2600" b="1" dirty="0">
+              <a:rPr lang="de-DE" sz="2600" b="1">
                 <a:solidFill>
                   <a:schemeClr val="bg1"/>
                 </a:solidFill>
@@ -19230,7 +19224,7 @@
               <a:t> but different </a:t>
             </a:r>
             <a:r>
-              <a:rPr lang="de-DE" sz="2600" b="1" dirty="0" err="1">
+              <a:rPr lang="de-DE" sz="2600" b="1" err="1">
                 <a:solidFill>
                   <a:schemeClr val="bg1"/>
                 </a:solidFill>
@@ -19238,7 +19232,7 @@
               <a:t>languages</a:t>
             </a:r>
             <a:r>
-              <a:rPr lang="de-DE" sz="2600" b="1" dirty="0">
+              <a:rPr lang="de-DE" sz="2600" b="1">
                 <a:solidFill>
                   <a:schemeClr val="bg1"/>
                 </a:solidFill>
@@ -19246,7 +19240,7 @@
               <a:t> (</a:t>
             </a:r>
             <a:r>
-              <a:rPr lang="de-DE" sz="2600" b="1" dirty="0" err="1">
+              <a:rPr lang="de-DE" sz="2600" b="1" err="1">
                 <a:solidFill>
                   <a:schemeClr val="bg1"/>
                 </a:solidFill>
@@ -19254,7 +19248,7 @@
               <a:t>detect_language</a:t>
             </a:r>
             <a:r>
-              <a:rPr lang="de-DE" sz="2600" b="1" dirty="0">
+              <a:rPr lang="de-DE" sz="2600" b="1">
                 <a:solidFill>
                   <a:schemeClr val="bg1"/>
                 </a:solidFill>
@@ -19264,7 +19258,7 @@
           </a:p>
           <a:p>
             <a:r>
-              <a:rPr lang="de-DE" sz="2600" b="1" dirty="0" err="1">
+              <a:rPr lang="de-DE" sz="2600" b="1" err="1">
                 <a:solidFill>
                   <a:schemeClr val="bg1"/>
                 </a:solidFill>
@@ -19272,7 +19266,7 @@
               <a:t>Translating</a:t>
             </a:r>
             <a:r>
-              <a:rPr lang="de-DE" sz="2600" b="1" dirty="0">
+              <a:rPr lang="de-DE" sz="2600" b="1">
                 <a:solidFill>
                   <a:schemeClr val="bg1"/>
                 </a:solidFill>
@@ -19280,7 +19274,7 @@
               <a:t> </a:t>
             </a:r>
             <a:r>
-              <a:rPr lang="de-DE" sz="2600" b="1" dirty="0" err="1">
+              <a:rPr lang="de-DE" sz="2600" b="1" err="1">
                 <a:solidFill>
                   <a:schemeClr val="bg1"/>
                 </a:solidFill>
@@ -19288,7 +19282,7 @@
               <a:t>with</a:t>
             </a:r>
             <a:r>
-              <a:rPr lang="de-DE" sz="2600" b="1" dirty="0">
+              <a:rPr lang="de-DE" sz="2600" b="1">
                 <a:solidFill>
                   <a:schemeClr val="bg1"/>
                 </a:solidFill>
@@ -19296,14 +19290,14 @@
               <a:t> </a:t>
             </a:r>
             <a:r>
-              <a:rPr lang="de-DE" sz="2600" b="1" dirty="0" err="1">
+              <a:rPr lang="de-DE" sz="2600" b="1" err="1">
                 <a:solidFill>
                   <a:schemeClr val="bg1"/>
                 </a:solidFill>
               </a:rPr>
               <a:t>openAI</a:t>
             </a:r>
-            <a:endParaRPr lang="de-AT" sz="2600" b="1" dirty="0">
+            <a:endParaRPr lang="de-AT" sz="2600" b="1">
               <a:solidFill>
                 <a:schemeClr val="bg1"/>
               </a:solidFill>

</xml_diff>